<commit_message>
Added extra question to feedback form
</commit_message>
<xml_diff>
--- a/docs/ReadAlliance Feedback.pptx
+++ b/docs/ReadAlliance Feedback.pptx
@@ -104,6 +104,11 @@
       </a:defRPr>
     </a:lvl9pPr>
   </p:defaultTextStyle>
+  <p:extLst>
+    <p:ext uri="{EFAFB233-063F-42B5-8137-9DF3F51BA10A}">
+      <p15:sldGuideLst xmlns:p15="http://schemas.microsoft.com/office/powerpoint/2012/main"/>
+    </p:ext>
+  </p:extLst>
 </p:presentation>
 </file>
 
@@ -157,7 +162,7 @@
           <a:noFill/>
           <a:extLst>
             <a:ext uri="{909E8E84-426E-40dd-AFC4-6F175D3DCCD1}">
-              <a14:hiddenFill xmlns:a14="http://schemas.microsoft.com/office/drawing/2010/main" xmlns="">
+              <a14:hiddenFill xmlns="" xmlns:a14="http://schemas.microsoft.com/office/drawing/2010/main">
                 <a:solidFill>
                   <a:srgbClr val="FFFFFF"/>
                 </a:solidFill>
@@ -217,7 +222,7 @@
             </a:ln>
             <a:extLst>
               <a:ext uri="{91240B29-F687-4f45-9708-019B960494DF}">
-                <a14:hiddenLine xmlns:a14="http://schemas.microsoft.com/office/drawing/2010/main" xmlns="" w="9525">
+                <a14:hiddenLine xmlns="" xmlns:a14="http://schemas.microsoft.com/office/drawing/2010/main" w="9525">
                   <a:solidFill>
                     <a:srgbClr val="000000"/>
                   </a:solidFill>
@@ -307,7 +312,7 @@
             </a:ln>
             <a:extLst>
               <a:ext uri="{91240B29-F687-4f45-9708-019B960494DF}">
-                <a14:hiddenLine xmlns:a14="http://schemas.microsoft.com/office/drawing/2010/main" xmlns="" w="9525">
+                <a14:hiddenLine xmlns="" xmlns:a14="http://schemas.microsoft.com/office/drawing/2010/main" w="9525">
                   <a:solidFill>
                     <a:srgbClr val="000000"/>
                   </a:solidFill>
@@ -397,7 +402,7 @@
             </a:ln>
             <a:extLst>
               <a:ext uri="{91240B29-F687-4f45-9708-019B960494DF}">
-                <a14:hiddenLine xmlns:a14="http://schemas.microsoft.com/office/drawing/2010/main" xmlns="" w="9525">
+                <a14:hiddenLine xmlns="" xmlns:a14="http://schemas.microsoft.com/office/drawing/2010/main" w="9525">
                   <a:solidFill>
                     <a:srgbClr val="000000"/>
                   </a:solidFill>
@@ -431,7 +436,7 @@
             </a:ln>
             <a:extLst>
               <a:ext uri="{91240B29-F687-4f45-9708-019B960494DF}">
-                <a14:hiddenLine xmlns:a14="http://schemas.microsoft.com/office/drawing/2010/main" xmlns="" w="9525">
+                <a14:hiddenLine xmlns="" xmlns:a14="http://schemas.microsoft.com/office/drawing/2010/main" w="9525">
                   <a:solidFill>
                     <a:srgbClr val="000000"/>
                   </a:solidFill>
@@ -521,7 +526,7 @@
             </a:ln>
             <a:extLst>
               <a:ext uri="{91240B29-F687-4f45-9708-019B960494DF}">
-                <a14:hiddenLine xmlns:a14="http://schemas.microsoft.com/office/drawing/2010/main" xmlns="" w="9525">
+                <a14:hiddenLine xmlns="" xmlns:a14="http://schemas.microsoft.com/office/drawing/2010/main" w="9525">
                   <a:solidFill>
                     <a:srgbClr val="000000"/>
                   </a:solidFill>
@@ -583,7 +588,7 @@
             </a:ln>
             <a:extLst>
               <a:ext uri="{91240B29-F687-4f45-9708-019B960494DF}">
-                <a14:hiddenLine xmlns:a14="http://schemas.microsoft.com/office/drawing/2010/main" xmlns="" w="9525">
+                <a14:hiddenLine xmlns="" xmlns:a14="http://schemas.microsoft.com/office/drawing/2010/main" w="9525">
                   <a:solidFill>
                     <a:srgbClr val="000000"/>
                   </a:solidFill>
@@ -645,7 +650,7 @@
             </a:ln>
             <a:extLst>
               <a:ext uri="{91240B29-F687-4f45-9708-019B960494DF}">
-                <a14:hiddenLine xmlns:a14="http://schemas.microsoft.com/office/drawing/2010/main" xmlns="" w="9525">
+                <a14:hiddenLine xmlns="" xmlns:a14="http://schemas.microsoft.com/office/drawing/2010/main" w="9525">
                   <a:solidFill>
                     <a:srgbClr val="000000"/>
                   </a:solidFill>
@@ -735,7 +740,7 @@
             </a:ln>
             <a:extLst>
               <a:ext uri="{91240B29-F687-4f45-9708-019B960494DF}">
-                <a14:hiddenLine xmlns:a14="http://schemas.microsoft.com/office/drawing/2010/main" xmlns="" w="9525">
+                <a14:hiddenLine xmlns="" xmlns:a14="http://schemas.microsoft.com/office/drawing/2010/main" w="9525">
                   <a:solidFill>
                     <a:srgbClr val="000000"/>
                   </a:solidFill>
@@ -797,7 +802,7 @@
             </a:ln>
             <a:extLst>
               <a:ext uri="{91240B29-F687-4f45-9708-019B960494DF}">
-                <a14:hiddenLine xmlns:a14="http://schemas.microsoft.com/office/drawing/2010/main" xmlns="" w="9525">
+                <a14:hiddenLine xmlns="" xmlns:a14="http://schemas.microsoft.com/office/drawing/2010/main" w="9525">
                   <a:solidFill>
                     <a:srgbClr val="000000"/>
                   </a:solidFill>
@@ -859,7 +864,7 @@
             </a:ln>
             <a:extLst>
               <a:ext uri="{91240B29-F687-4f45-9708-019B960494DF}">
-                <a14:hiddenLine xmlns:a14="http://schemas.microsoft.com/office/drawing/2010/main" xmlns="" w="9525">
+                <a14:hiddenLine xmlns="" xmlns:a14="http://schemas.microsoft.com/office/drawing/2010/main" w="9525">
                   <a:solidFill>
                     <a:srgbClr val="000000"/>
                   </a:solidFill>
@@ -949,7 +954,7 @@
             </a:ln>
             <a:extLst>
               <a:ext uri="{91240B29-F687-4f45-9708-019B960494DF}">
-                <a14:hiddenLine xmlns:a14="http://schemas.microsoft.com/office/drawing/2010/main" xmlns="" w="9525">
+                <a14:hiddenLine xmlns="" xmlns:a14="http://schemas.microsoft.com/office/drawing/2010/main" w="9525">
                   <a:solidFill>
                     <a:srgbClr val="000000"/>
                   </a:solidFill>
@@ -1039,7 +1044,7 @@
             </a:ln>
             <a:extLst>
               <a:ext uri="{91240B29-F687-4f45-9708-019B960494DF}">
-                <a14:hiddenLine xmlns:a14="http://schemas.microsoft.com/office/drawing/2010/main" xmlns="" w="9525">
+                <a14:hiddenLine xmlns="" xmlns:a14="http://schemas.microsoft.com/office/drawing/2010/main" w="9525">
                   <a:solidFill>
                     <a:srgbClr val="000000"/>
                   </a:solidFill>
@@ -1101,7 +1106,7 @@
             </a:ln>
             <a:extLst>
               <a:ext uri="{91240B29-F687-4f45-9708-019B960494DF}">
-                <a14:hiddenLine xmlns:a14="http://schemas.microsoft.com/office/drawing/2010/main" xmlns="" w="9525">
+                <a14:hiddenLine xmlns="" xmlns:a14="http://schemas.microsoft.com/office/drawing/2010/main" w="9525">
                   <a:solidFill>
                     <a:srgbClr val="000000"/>
                   </a:solidFill>
@@ -1211,7 +1216,7 @@
             </a:ln>
             <a:extLst>
               <a:ext uri="{91240B29-F687-4f45-9708-019B960494DF}">
-                <a14:hiddenLine xmlns:a14="http://schemas.microsoft.com/office/drawing/2010/main" xmlns="" w="9525">
+                <a14:hiddenLine xmlns="" xmlns:a14="http://schemas.microsoft.com/office/drawing/2010/main" w="9525">
                   <a:solidFill>
                     <a:srgbClr val="000000"/>
                   </a:solidFill>
@@ -1273,7 +1278,7 @@
             </a:ln>
             <a:extLst>
               <a:ext uri="{91240B29-F687-4f45-9708-019B960494DF}">
-                <a14:hiddenLine xmlns:a14="http://schemas.microsoft.com/office/drawing/2010/main" xmlns="" w="9525">
+                <a14:hiddenLine xmlns="" xmlns:a14="http://schemas.microsoft.com/office/drawing/2010/main" w="9525">
                   <a:solidFill>
                     <a:srgbClr val="000000"/>
                   </a:solidFill>
@@ -1363,7 +1368,7 @@
             </a:ln>
             <a:extLst>
               <a:ext uri="{91240B29-F687-4f45-9708-019B960494DF}">
-                <a14:hiddenLine xmlns:a14="http://schemas.microsoft.com/office/drawing/2010/main" xmlns="" w="9525">
+                <a14:hiddenLine xmlns="" xmlns:a14="http://schemas.microsoft.com/office/drawing/2010/main" w="9525">
                   <a:solidFill>
                     <a:srgbClr val="000000"/>
                   </a:solidFill>
@@ -1453,7 +1458,7 @@
             </a:ln>
             <a:extLst>
               <a:ext uri="{91240B29-F687-4f45-9708-019B960494DF}">
-                <a14:hiddenLine xmlns:a14="http://schemas.microsoft.com/office/drawing/2010/main" xmlns="" w="9525">
+                <a14:hiddenLine xmlns="" xmlns:a14="http://schemas.microsoft.com/office/drawing/2010/main" w="9525">
                   <a:solidFill>
                     <a:srgbClr val="000000"/>
                   </a:solidFill>
@@ -1515,7 +1520,7 @@
             </a:ln>
             <a:extLst>
               <a:ext uri="{91240B29-F687-4f45-9708-019B960494DF}">
-                <a14:hiddenLine xmlns:a14="http://schemas.microsoft.com/office/drawing/2010/main" xmlns="" w="9525">
+                <a14:hiddenLine xmlns="" xmlns:a14="http://schemas.microsoft.com/office/drawing/2010/main" w="9525">
                   <a:solidFill>
                     <a:srgbClr val="000000"/>
                   </a:solidFill>
@@ -1605,7 +1610,7 @@
             </a:ln>
             <a:extLst>
               <a:ext uri="{91240B29-F687-4f45-9708-019B960494DF}">
-                <a14:hiddenLine xmlns:a14="http://schemas.microsoft.com/office/drawing/2010/main" xmlns="" w="9525">
+                <a14:hiddenLine xmlns="" xmlns:a14="http://schemas.microsoft.com/office/drawing/2010/main" w="9525">
                   <a:solidFill>
                     <a:srgbClr val="000000"/>
                   </a:solidFill>
@@ -1695,7 +1700,7 @@
             </a:ln>
             <a:extLst>
               <a:ext uri="{91240B29-F687-4f45-9708-019B960494DF}">
-                <a14:hiddenLine xmlns:a14="http://schemas.microsoft.com/office/drawing/2010/main" xmlns="" w="9525">
+                <a14:hiddenLine xmlns="" xmlns:a14="http://schemas.microsoft.com/office/drawing/2010/main" w="9525">
                   <a:solidFill>
                     <a:srgbClr val="000000"/>
                   </a:solidFill>
@@ -1751,7 +1756,7 @@
             </a:ln>
             <a:extLst>
               <a:ext uri="{91240B29-F687-4f45-9708-019B960494DF}">
-                <a14:hiddenLine xmlns:a14="http://schemas.microsoft.com/office/drawing/2010/main" xmlns="" w="9525">
+                <a14:hiddenLine xmlns="" xmlns:a14="http://schemas.microsoft.com/office/drawing/2010/main" w="9525">
                   <a:solidFill>
                     <a:srgbClr val="000000"/>
                   </a:solidFill>
@@ -1841,7 +1846,7 @@
             </a:ln>
             <a:extLst>
               <a:ext uri="{91240B29-F687-4f45-9708-019B960494DF}">
-                <a14:hiddenLine xmlns:a14="http://schemas.microsoft.com/office/drawing/2010/main" xmlns="" w="9525">
+                <a14:hiddenLine xmlns="" xmlns:a14="http://schemas.microsoft.com/office/drawing/2010/main" w="9525">
                   <a:solidFill>
                     <a:srgbClr val="000000"/>
                   </a:solidFill>
@@ -1897,7 +1902,7 @@
             </a:ln>
             <a:extLst>
               <a:ext uri="{91240B29-F687-4f45-9708-019B960494DF}">
-                <a14:hiddenLine xmlns:a14="http://schemas.microsoft.com/office/drawing/2010/main" xmlns="" w="9525">
+                <a14:hiddenLine xmlns="" xmlns:a14="http://schemas.microsoft.com/office/drawing/2010/main" w="9525">
                   <a:solidFill>
                     <a:srgbClr val="000000"/>
                   </a:solidFill>
@@ -1987,7 +1992,7 @@
             </a:ln>
             <a:extLst>
               <a:ext uri="{91240B29-F687-4f45-9708-019B960494DF}">
-                <a14:hiddenLine xmlns:a14="http://schemas.microsoft.com/office/drawing/2010/main" xmlns="" w="9525">
+                <a14:hiddenLine xmlns="" xmlns:a14="http://schemas.microsoft.com/office/drawing/2010/main" w="9525">
                   <a:solidFill>
                     <a:srgbClr val="000000"/>
                   </a:solidFill>
@@ -2055,7 +2060,7 @@
             </a:ln>
             <a:extLst>
               <a:ext uri="{91240B29-F687-4f45-9708-019B960494DF}">
-                <a14:hiddenLine xmlns:a14="http://schemas.microsoft.com/office/drawing/2010/main" xmlns="" w="9525">
+                <a14:hiddenLine xmlns="" xmlns:a14="http://schemas.microsoft.com/office/drawing/2010/main" w="9525">
                   <a:solidFill>
                     <a:srgbClr val="000000"/>
                   </a:solidFill>
@@ -2145,7 +2150,7 @@
             </a:ln>
             <a:extLst>
               <a:ext uri="{91240B29-F687-4f45-9708-019B960494DF}">
-                <a14:hiddenLine xmlns:a14="http://schemas.microsoft.com/office/drawing/2010/main" xmlns="" w="9525">
+                <a14:hiddenLine xmlns="" xmlns:a14="http://schemas.microsoft.com/office/drawing/2010/main" w="9525">
                   <a:solidFill>
                     <a:srgbClr val="000000"/>
                   </a:solidFill>
@@ -2213,7 +2218,7 @@
             </a:ln>
             <a:extLst>
               <a:ext uri="{91240B29-F687-4f45-9708-019B960494DF}">
-                <a14:hiddenLine xmlns:a14="http://schemas.microsoft.com/office/drawing/2010/main" xmlns="" w="9525">
+                <a14:hiddenLine xmlns="" xmlns:a14="http://schemas.microsoft.com/office/drawing/2010/main" w="9525">
                   <a:solidFill>
                     <a:srgbClr val="000000"/>
                   </a:solidFill>
@@ -2303,7 +2308,7 @@
             </a:ln>
             <a:extLst>
               <a:ext uri="{91240B29-F687-4f45-9708-019B960494DF}">
-                <a14:hiddenLine xmlns:a14="http://schemas.microsoft.com/office/drawing/2010/main" xmlns="" w="9525">
+                <a14:hiddenLine xmlns="" xmlns:a14="http://schemas.microsoft.com/office/drawing/2010/main" w="9525">
                   <a:solidFill>
                     <a:srgbClr val="000000"/>
                   </a:solidFill>
@@ -2337,7 +2342,7 @@
             </a:ln>
             <a:extLst>
               <a:ext uri="{91240B29-F687-4f45-9708-019B960494DF}">
-                <a14:hiddenLine xmlns:a14="http://schemas.microsoft.com/office/drawing/2010/main" xmlns="" w="9525">
+                <a14:hiddenLine xmlns="" xmlns:a14="http://schemas.microsoft.com/office/drawing/2010/main" w="9525">
                   <a:solidFill>
                     <a:srgbClr val="000000"/>
                   </a:solidFill>
@@ -2427,7 +2432,7 @@
             </a:ln>
             <a:extLst>
               <a:ext uri="{91240B29-F687-4f45-9708-019B960494DF}">
-                <a14:hiddenLine xmlns:a14="http://schemas.microsoft.com/office/drawing/2010/main" xmlns="" w="9525">
+                <a14:hiddenLine xmlns="" xmlns:a14="http://schemas.microsoft.com/office/drawing/2010/main" w="9525">
                   <a:solidFill>
                     <a:srgbClr val="000000"/>
                   </a:solidFill>
@@ -2489,7 +2494,7 @@
             </a:ln>
             <a:extLst>
               <a:ext uri="{91240B29-F687-4f45-9708-019B960494DF}">
-                <a14:hiddenLine xmlns:a14="http://schemas.microsoft.com/office/drawing/2010/main" xmlns="" w="9525">
+                <a14:hiddenLine xmlns="" xmlns:a14="http://schemas.microsoft.com/office/drawing/2010/main" w="9525">
                   <a:solidFill>
                     <a:srgbClr val="000000"/>
                   </a:solidFill>
@@ -2551,7 +2556,7 @@
             </a:ln>
             <a:extLst>
               <a:ext uri="{91240B29-F687-4f45-9708-019B960494DF}">
-                <a14:hiddenLine xmlns:a14="http://schemas.microsoft.com/office/drawing/2010/main" xmlns="" w="9525">
+                <a14:hiddenLine xmlns="" xmlns:a14="http://schemas.microsoft.com/office/drawing/2010/main" w="9525">
                   <a:solidFill>
                     <a:srgbClr val="000000"/>
                   </a:solidFill>
@@ -2641,7 +2646,7 @@
             </a:ln>
             <a:extLst>
               <a:ext uri="{91240B29-F687-4f45-9708-019B960494DF}">
-                <a14:hiddenLine xmlns:a14="http://schemas.microsoft.com/office/drawing/2010/main" xmlns="" w="9525">
+                <a14:hiddenLine xmlns="" xmlns:a14="http://schemas.microsoft.com/office/drawing/2010/main" w="9525">
                   <a:solidFill>
                     <a:srgbClr val="000000"/>
                   </a:solidFill>
@@ -2709,7 +2714,7 @@
             </a:ln>
             <a:extLst>
               <a:ext uri="{91240B29-F687-4f45-9708-019B960494DF}">
-                <a14:hiddenLine xmlns:a14="http://schemas.microsoft.com/office/drawing/2010/main" xmlns="" w="9525">
+                <a14:hiddenLine xmlns="" xmlns:a14="http://schemas.microsoft.com/office/drawing/2010/main" w="9525">
                   <a:solidFill>
                     <a:srgbClr val="000000"/>
                   </a:solidFill>
@@ -2771,7 +2776,7 @@
             </a:ln>
             <a:extLst>
               <a:ext uri="{91240B29-F687-4f45-9708-019B960494DF}">
-                <a14:hiddenLine xmlns:a14="http://schemas.microsoft.com/office/drawing/2010/main" xmlns="" w="9525">
+                <a14:hiddenLine xmlns="" xmlns:a14="http://schemas.microsoft.com/office/drawing/2010/main" w="9525">
                   <a:solidFill>
                     <a:srgbClr val="000000"/>
                   </a:solidFill>
@@ -2861,7 +2866,7 @@
             </a:ln>
             <a:extLst>
               <a:ext uri="{91240B29-F687-4f45-9708-019B960494DF}">
-                <a14:hiddenLine xmlns:a14="http://schemas.microsoft.com/office/drawing/2010/main" xmlns="" w="9525">
+                <a14:hiddenLine xmlns="" xmlns:a14="http://schemas.microsoft.com/office/drawing/2010/main" w="9525">
                   <a:solidFill>
                     <a:srgbClr val="000000"/>
                   </a:solidFill>
@@ -2923,7 +2928,7 @@
             </a:ln>
             <a:extLst>
               <a:ext uri="{91240B29-F687-4f45-9708-019B960494DF}">
-                <a14:hiddenLine xmlns:a14="http://schemas.microsoft.com/office/drawing/2010/main" xmlns="" w="9525">
+                <a14:hiddenLine xmlns="" xmlns:a14="http://schemas.microsoft.com/office/drawing/2010/main" w="9525">
                   <a:solidFill>
                     <a:srgbClr val="000000"/>
                   </a:solidFill>
@@ -3013,7 +3018,7 @@
             </a:ln>
             <a:extLst>
               <a:ext uri="{91240B29-F687-4f45-9708-019B960494DF}">
-                <a14:hiddenLine xmlns:a14="http://schemas.microsoft.com/office/drawing/2010/main" xmlns="" w="9525">
+                <a14:hiddenLine xmlns="" xmlns:a14="http://schemas.microsoft.com/office/drawing/2010/main" w="9525">
                   <a:solidFill>
                     <a:srgbClr val="000000"/>
                   </a:solidFill>
@@ -3075,7 +3080,7 @@
             </a:ln>
             <a:extLst>
               <a:ext uri="{91240B29-F687-4f45-9708-019B960494DF}">
-                <a14:hiddenLine xmlns:a14="http://schemas.microsoft.com/office/drawing/2010/main" xmlns="" w="9525">
+                <a14:hiddenLine xmlns="" xmlns:a14="http://schemas.microsoft.com/office/drawing/2010/main" w="9525">
                   <a:solidFill>
                     <a:srgbClr val="000000"/>
                   </a:solidFill>
@@ -3165,7 +3170,7 @@
             </a:ln>
             <a:extLst>
               <a:ext uri="{91240B29-F687-4f45-9708-019B960494DF}">
-                <a14:hiddenLine xmlns:a14="http://schemas.microsoft.com/office/drawing/2010/main" xmlns="" w="9525">
+                <a14:hiddenLine xmlns="" xmlns:a14="http://schemas.microsoft.com/office/drawing/2010/main" w="9525">
                   <a:solidFill>
                     <a:srgbClr val="000000"/>
                   </a:solidFill>
@@ -3199,7 +3204,7 @@
             </a:ln>
             <a:extLst>
               <a:ext uri="{91240B29-F687-4f45-9708-019B960494DF}">
-                <a14:hiddenLine xmlns:a14="http://schemas.microsoft.com/office/drawing/2010/main" xmlns="" w="9525">
+                <a14:hiddenLine xmlns="" xmlns:a14="http://schemas.microsoft.com/office/drawing/2010/main" w="9525">
                   <a:solidFill>
                     <a:srgbClr val="000000"/>
                   </a:solidFill>
@@ -3264,7 +3269,7 @@
             </a:ln>
             <a:extLst>
               <a:ext uri="{91240B29-F687-4f45-9708-019B960494DF}">
-                <a14:hiddenLine xmlns:a14="http://schemas.microsoft.com/office/drawing/2010/main" xmlns="" w="9525">
+                <a14:hiddenLine xmlns="" xmlns:a14="http://schemas.microsoft.com/office/drawing/2010/main" w="9525">
                   <a:solidFill>
                     <a:srgbClr val="000000"/>
                   </a:solidFill>
@@ -3354,7 +3359,7 @@
             </a:ln>
             <a:extLst>
               <a:ext uri="{91240B29-F687-4f45-9708-019B960494DF}">
-                <a14:hiddenLine xmlns:a14="http://schemas.microsoft.com/office/drawing/2010/main" xmlns="" w="9525">
+                <a14:hiddenLine xmlns="" xmlns:a14="http://schemas.microsoft.com/office/drawing/2010/main" w="9525">
                   <a:solidFill>
                     <a:srgbClr val="000000"/>
                   </a:solidFill>
@@ -3416,7 +3421,7 @@
             </a:ln>
             <a:extLst>
               <a:ext uri="{91240B29-F687-4f45-9708-019B960494DF}">
-                <a14:hiddenLine xmlns:a14="http://schemas.microsoft.com/office/drawing/2010/main" xmlns="" w="9525">
+                <a14:hiddenLine xmlns="" xmlns:a14="http://schemas.microsoft.com/office/drawing/2010/main" w="9525">
                   <a:solidFill>
                     <a:srgbClr val="000000"/>
                   </a:solidFill>
@@ -3506,7 +3511,7 @@
             </a:ln>
             <a:extLst>
               <a:ext uri="{91240B29-F687-4f45-9708-019B960494DF}">
-                <a14:hiddenLine xmlns:a14="http://schemas.microsoft.com/office/drawing/2010/main" xmlns="" w="9525">
+                <a14:hiddenLine xmlns="" xmlns:a14="http://schemas.microsoft.com/office/drawing/2010/main" w="9525">
                   <a:solidFill>
                     <a:srgbClr val="000000"/>
                   </a:solidFill>
@@ -3596,7 +3601,7 @@
             </a:ln>
             <a:extLst>
               <a:ext uri="{91240B29-F687-4f45-9708-019B960494DF}">
-                <a14:hiddenLine xmlns:a14="http://schemas.microsoft.com/office/drawing/2010/main" xmlns="" w="9525">
+                <a14:hiddenLine xmlns="" xmlns:a14="http://schemas.microsoft.com/office/drawing/2010/main" w="9525">
                   <a:solidFill>
                     <a:srgbClr val="000000"/>
                   </a:solidFill>
@@ -3661,7 +3666,7 @@
             </a:ln>
             <a:extLst>
               <a:ext uri="{91240B29-F687-4f45-9708-019B960494DF}">
-                <a14:hiddenLine xmlns:a14="http://schemas.microsoft.com/office/drawing/2010/main" xmlns="" w="9525">
+                <a14:hiddenLine xmlns="" xmlns:a14="http://schemas.microsoft.com/office/drawing/2010/main" w="9525">
                   <a:solidFill>
                     <a:srgbClr val="000000"/>
                   </a:solidFill>
@@ -3723,7 +3728,7 @@
             </a:ln>
             <a:extLst>
               <a:ext uri="{91240B29-F687-4f45-9708-019B960494DF}">
-                <a14:hiddenLine xmlns:a14="http://schemas.microsoft.com/office/drawing/2010/main" xmlns="" w="9525">
+                <a14:hiddenLine xmlns="" xmlns:a14="http://schemas.microsoft.com/office/drawing/2010/main" w="9525">
                   <a:solidFill>
                     <a:srgbClr val="000000"/>
                   </a:solidFill>
@@ -3813,7 +3818,7 @@
             </a:ln>
             <a:extLst>
               <a:ext uri="{91240B29-F687-4f45-9708-019B960494DF}">
-                <a14:hiddenLine xmlns:a14="http://schemas.microsoft.com/office/drawing/2010/main" xmlns="" w="9525">
+                <a14:hiddenLine xmlns="" xmlns:a14="http://schemas.microsoft.com/office/drawing/2010/main" w="9525">
                   <a:solidFill>
                     <a:srgbClr val="000000"/>
                   </a:solidFill>
@@ -3903,7 +3908,7 @@
             </a:ln>
             <a:extLst>
               <a:ext uri="{91240B29-F687-4f45-9708-019B960494DF}">
-                <a14:hiddenLine xmlns:a14="http://schemas.microsoft.com/office/drawing/2010/main" xmlns="" w="9525">
+                <a14:hiddenLine xmlns="" xmlns:a14="http://schemas.microsoft.com/office/drawing/2010/main" w="9525">
                   <a:solidFill>
                     <a:srgbClr val="000000"/>
                   </a:solidFill>
@@ -3965,7 +3970,7 @@
             </a:ln>
             <a:extLst>
               <a:ext uri="{91240B29-F687-4f45-9708-019B960494DF}">
-                <a14:hiddenLine xmlns:a14="http://schemas.microsoft.com/office/drawing/2010/main" xmlns="" w="9525">
+                <a14:hiddenLine xmlns="" xmlns:a14="http://schemas.microsoft.com/office/drawing/2010/main" w="9525">
                   <a:solidFill>
                     <a:srgbClr val="000000"/>
                   </a:solidFill>
@@ -4085,7 +4090,7 @@
             </a:ln>
             <a:extLst>
               <a:ext uri="{91240B29-F687-4f45-9708-019B960494DF}">
-                <a14:hiddenLine xmlns:a14="http://schemas.microsoft.com/office/drawing/2010/main" xmlns="" w="9525">
+                <a14:hiddenLine xmlns="" xmlns:a14="http://schemas.microsoft.com/office/drawing/2010/main" w="9525">
                   <a:solidFill>
                     <a:srgbClr val="000000"/>
                   </a:solidFill>
@@ -4153,7 +4158,7 @@
             </a:ln>
             <a:extLst>
               <a:ext uri="{91240B29-F687-4f45-9708-019B960494DF}">
-                <a14:hiddenLine xmlns:a14="http://schemas.microsoft.com/office/drawing/2010/main" xmlns="" w="9525">
+                <a14:hiddenLine xmlns="" xmlns:a14="http://schemas.microsoft.com/office/drawing/2010/main" w="9525">
                   <a:solidFill>
                     <a:srgbClr val="000000"/>
                   </a:solidFill>
@@ -4243,7 +4248,7 @@
             </a:ln>
             <a:extLst>
               <a:ext uri="{91240B29-F687-4f45-9708-019B960494DF}">
-                <a14:hiddenLine xmlns:a14="http://schemas.microsoft.com/office/drawing/2010/main" xmlns="" w="9525">
+                <a14:hiddenLine xmlns="" xmlns:a14="http://schemas.microsoft.com/office/drawing/2010/main" w="9525">
                   <a:solidFill>
                     <a:srgbClr val="000000"/>
                   </a:solidFill>
@@ -9050,7 +9055,7 @@
           <a:noFill/>
           <a:extLst>
             <a:ext uri="{909E8E84-426E-40dd-AFC4-6F175D3DCCD1}">
-              <a14:hiddenFill xmlns:a14="http://schemas.microsoft.com/office/drawing/2010/main" xmlns="">
+              <a14:hiddenFill xmlns="" xmlns:a14="http://schemas.microsoft.com/office/drawing/2010/main">
                 <a:solidFill>
                   <a:srgbClr val="FFFFFF"/>
                 </a:solidFill>
@@ -9124,7 +9129,7 @@
               </a:ln>
               <a:extLst>
                 <a:ext uri="{91240B29-F687-4f45-9708-019B960494DF}">
-                  <a14:hiddenLine xmlns:a14="http://schemas.microsoft.com/office/drawing/2010/main" xmlns="" w="9525">
+                  <a14:hiddenLine xmlns="" xmlns:a14="http://schemas.microsoft.com/office/drawing/2010/main" w="9525">
                     <a:solidFill>
                       <a:srgbClr val="000000"/>
                     </a:solidFill>
@@ -9214,7 +9219,7 @@
               </a:ln>
               <a:extLst>
                 <a:ext uri="{91240B29-F687-4f45-9708-019B960494DF}">
-                  <a14:hiddenLine xmlns:a14="http://schemas.microsoft.com/office/drawing/2010/main" xmlns="" w="9525">
+                  <a14:hiddenLine xmlns="" xmlns:a14="http://schemas.microsoft.com/office/drawing/2010/main" w="9525">
                     <a:solidFill>
                       <a:srgbClr val="000000"/>
                     </a:solidFill>
@@ -9304,7 +9309,7 @@
               </a:ln>
               <a:extLst>
                 <a:ext uri="{91240B29-F687-4f45-9708-019B960494DF}">
-                  <a14:hiddenLine xmlns:a14="http://schemas.microsoft.com/office/drawing/2010/main" xmlns="" w="9525">
+                  <a14:hiddenLine xmlns="" xmlns:a14="http://schemas.microsoft.com/office/drawing/2010/main" w="9525">
                     <a:solidFill>
                       <a:srgbClr val="000000"/>
                     </a:solidFill>
@@ -9366,7 +9371,7 @@
               </a:ln>
               <a:extLst>
                 <a:ext uri="{91240B29-F687-4f45-9708-019B960494DF}">
-                  <a14:hiddenLine xmlns:a14="http://schemas.microsoft.com/office/drawing/2010/main" xmlns="" w="9525">
+                  <a14:hiddenLine xmlns="" xmlns:a14="http://schemas.microsoft.com/office/drawing/2010/main" w="9525">
                     <a:solidFill>
                       <a:srgbClr val="000000"/>
                     </a:solidFill>
@@ -9456,7 +9461,7 @@
               </a:ln>
               <a:extLst>
                 <a:ext uri="{91240B29-F687-4f45-9708-019B960494DF}">
-                  <a14:hiddenLine xmlns:a14="http://schemas.microsoft.com/office/drawing/2010/main" xmlns="" w="9525">
+                  <a14:hiddenLine xmlns="" xmlns:a14="http://schemas.microsoft.com/office/drawing/2010/main" w="9525">
                     <a:solidFill>
                       <a:srgbClr val="000000"/>
                     </a:solidFill>
@@ -9518,7 +9523,7 @@
               </a:ln>
               <a:extLst>
                 <a:ext uri="{91240B29-F687-4f45-9708-019B960494DF}">
-                  <a14:hiddenLine xmlns:a14="http://schemas.microsoft.com/office/drawing/2010/main" xmlns="" w="9525">
+                  <a14:hiddenLine xmlns="" xmlns:a14="http://schemas.microsoft.com/office/drawing/2010/main" w="9525">
                     <a:solidFill>
                       <a:srgbClr val="000000"/>
                     </a:solidFill>
@@ -9580,7 +9585,7 @@
               </a:ln>
               <a:extLst>
                 <a:ext uri="{91240B29-F687-4f45-9708-019B960494DF}">
-                  <a14:hiddenLine xmlns:a14="http://schemas.microsoft.com/office/drawing/2010/main" xmlns="" w="9525">
+                  <a14:hiddenLine xmlns="" xmlns:a14="http://schemas.microsoft.com/office/drawing/2010/main" w="9525">
                     <a:solidFill>
                       <a:srgbClr val="000000"/>
                     </a:solidFill>
@@ -9670,7 +9675,7 @@
               </a:ln>
               <a:extLst>
                 <a:ext uri="{91240B29-F687-4f45-9708-019B960494DF}">
-                  <a14:hiddenLine xmlns:a14="http://schemas.microsoft.com/office/drawing/2010/main" xmlns="" w="9525">
+                  <a14:hiddenLine xmlns="" xmlns:a14="http://schemas.microsoft.com/office/drawing/2010/main" w="9525">
                     <a:solidFill>
                       <a:srgbClr val="000000"/>
                     </a:solidFill>
@@ -9760,7 +9765,7 @@
               </a:ln>
               <a:extLst>
                 <a:ext uri="{91240B29-F687-4f45-9708-019B960494DF}">
-                  <a14:hiddenLine xmlns:a14="http://schemas.microsoft.com/office/drawing/2010/main" xmlns="" w="9525">
+                  <a14:hiddenLine xmlns="" xmlns:a14="http://schemas.microsoft.com/office/drawing/2010/main" w="9525">
                     <a:solidFill>
                       <a:srgbClr val="000000"/>
                     </a:solidFill>
@@ -9822,7 +9827,7 @@
               </a:ln>
               <a:extLst>
                 <a:ext uri="{91240B29-F687-4f45-9708-019B960494DF}">
-                  <a14:hiddenLine xmlns:a14="http://schemas.microsoft.com/office/drawing/2010/main" xmlns="" w="9525">
+                  <a14:hiddenLine xmlns="" xmlns:a14="http://schemas.microsoft.com/office/drawing/2010/main" w="9525">
                     <a:solidFill>
                       <a:srgbClr val="000000"/>
                     </a:solidFill>
@@ -9932,7 +9937,7 @@
               </a:ln>
               <a:extLst>
                 <a:ext uri="{91240B29-F687-4f45-9708-019B960494DF}">
-                  <a14:hiddenLine xmlns:a14="http://schemas.microsoft.com/office/drawing/2010/main" xmlns="" w="9525">
+                  <a14:hiddenLine xmlns="" xmlns:a14="http://schemas.microsoft.com/office/drawing/2010/main" w="9525">
                     <a:solidFill>
                       <a:srgbClr val="000000"/>
                     </a:solidFill>
@@ -10016,7 +10021,7 @@
               </a:ln>
               <a:extLst>
                 <a:ext uri="{91240B29-F687-4f45-9708-019B960494DF}">
-                  <a14:hiddenLine xmlns:a14="http://schemas.microsoft.com/office/drawing/2010/main" xmlns="" w="9525">
+                  <a14:hiddenLine xmlns="" xmlns:a14="http://schemas.microsoft.com/office/drawing/2010/main" w="9525">
                     <a:solidFill>
                       <a:srgbClr val="000000"/>
                     </a:solidFill>
@@ -10078,7 +10083,7 @@
               </a:ln>
               <a:extLst>
                 <a:ext uri="{91240B29-F687-4f45-9708-019B960494DF}">
-                  <a14:hiddenLine xmlns:a14="http://schemas.microsoft.com/office/drawing/2010/main" xmlns="" w="9525">
+                  <a14:hiddenLine xmlns="" xmlns:a14="http://schemas.microsoft.com/office/drawing/2010/main" w="9525">
                     <a:solidFill>
                       <a:srgbClr val="000000"/>
                     </a:solidFill>
@@ -10140,7 +10145,7 @@
               </a:ln>
               <a:extLst>
                 <a:ext uri="{91240B29-F687-4f45-9708-019B960494DF}">
-                  <a14:hiddenLine xmlns:a14="http://schemas.microsoft.com/office/drawing/2010/main" xmlns="" w="9525">
+                  <a14:hiddenLine xmlns="" xmlns:a14="http://schemas.microsoft.com/office/drawing/2010/main" w="9525">
                     <a:solidFill>
                       <a:srgbClr val="000000"/>
                     </a:solidFill>
@@ -10230,7 +10235,7 @@
               </a:ln>
               <a:extLst>
                 <a:ext uri="{91240B29-F687-4f45-9708-019B960494DF}">
-                  <a14:hiddenLine xmlns:a14="http://schemas.microsoft.com/office/drawing/2010/main" xmlns="" w="9525">
+                  <a14:hiddenLine xmlns="" xmlns:a14="http://schemas.microsoft.com/office/drawing/2010/main" w="9525">
                     <a:solidFill>
                       <a:srgbClr val="000000"/>
                     </a:solidFill>
@@ -10264,7 +10269,7 @@
               </a:ln>
               <a:extLst>
                 <a:ext uri="{91240B29-F687-4f45-9708-019B960494DF}">
-                  <a14:hiddenLine xmlns:a14="http://schemas.microsoft.com/office/drawing/2010/main" xmlns="" w="9525">
+                  <a14:hiddenLine xmlns="" xmlns:a14="http://schemas.microsoft.com/office/drawing/2010/main" w="9525">
                     <a:solidFill>
                       <a:srgbClr val="000000"/>
                     </a:solidFill>
@@ -10329,7 +10334,7 @@
               </a:ln>
               <a:extLst>
                 <a:ext uri="{91240B29-F687-4f45-9708-019B960494DF}">
-                  <a14:hiddenLine xmlns:a14="http://schemas.microsoft.com/office/drawing/2010/main" xmlns="" w="9525">
+                  <a14:hiddenLine xmlns="" xmlns:a14="http://schemas.microsoft.com/office/drawing/2010/main" w="9525">
                     <a:solidFill>
                       <a:srgbClr val="000000"/>
                     </a:solidFill>
@@ -10419,7 +10424,7 @@
               </a:ln>
               <a:extLst>
                 <a:ext uri="{91240B29-F687-4f45-9708-019B960494DF}">
-                  <a14:hiddenLine xmlns:a14="http://schemas.microsoft.com/office/drawing/2010/main" xmlns="" w="9525">
+                  <a14:hiddenLine xmlns="" xmlns:a14="http://schemas.microsoft.com/office/drawing/2010/main" w="9525">
                     <a:solidFill>
                       <a:srgbClr val="000000"/>
                     </a:solidFill>
@@ -10481,7 +10486,7 @@
               </a:ln>
               <a:extLst>
                 <a:ext uri="{91240B29-F687-4f45-9708-019B960494DF}">
-                  <a14:hiddenLine xmlns:a14="http://schemas.microsoft.com/office/drawing/2010/main" xmlns="" w="9525">
+                  <a14:hiddenLine xmlns="" xmlns:a14="http://schemas.microsoft.com/office/drawing/2010/main" w="9525">
                     <a:solidFill>
                       <a:srgbClr val="000000"/>
                     </a:solidFill>
@@ -10571,7 +10576,7 @@
               </a:ln>
               <a:extLst>
                 <a:ext uri="{91240B29-F687-4f45-9708-019B960494DF}">
-                  <a14:hiddenLine xmlns:a14="http://schemas.microsoft.com/office/drawing/2010/main" xmlns="" w="9525">
+                  <a14:hiddenLine xmlns="" xmlns:a14="http://schemas.microsoft.com/office/drawing/2010/main" w="9525">
                     <a:solidFill>
                       <a:srgbClr val="000000"/>
                     </a:solidFill>
@@ -10636,7 +10641,7 @@
               </a:ln>
               <a:extLst>
                 <a:ext uri="{91240B29-F687-4f45-9708-019B960494DF}">
-                  <a14:hiddenLine xmlns:a14="http://schemas.microsoft.com/office/drawing/2010/main" xmlns="" w="9525">
+                  <a14:hiddenLine xmlns="" xmlns:a14="http://schemas.microsoft.com/office/drawing/2010/main" w="9525">
                     <a:solidFill>
                       <a:srgbClr val="000000"/>
                     </a:solidFill>
@@ -10698,7 +10703,7 @@
               </a:ln>
               <a:extLst>
                 <a:ext uri="{91240B29-F687-4f45-9708-019B960494DF}">
-                  <a14:hiddenLine xmlns:a14="http://schemas.microsoft.com/office/drawing/2010/main" xmlns="" w="9525">
+                  <a14:hiddenLine xmlns="" xmlns:a14="http://schemas.microsoft.com/office/drawing/2010/main" w="9525">
                     <a:solidFill>
                       <a:srgbClr val="000000"/>
                     </a:solidFill>
@@ -10788,7 +10793,7 @@
               </a:ln>
               <a:extLst>
                 <a:ext uri="{91240B29-F687-4f45-9708-019B960494DF}">
-                  <a14:hiddenLine xmlns:a14="http://schemas.microsoft.com/office/drawing/2010/main" xmlns="" w="9525">
+                  <a14:hiddenLine xmlns="" xmlns:a14="http://schemas.microsoft.com/office/drawing/2010/main" w="9525">
                     <a:solidFill>
                       <a:srgbClr val="000000"/>
                     </a:solidFill>
@@ -10878,7 +10883,7 @@
               </a:ln>
               <a:extLst>
                 <a:ext uri="{91240B29-F687-4f45-9708-019B960494DF}">
-                  <a14:hiddenLine xmlns:a14="http://schemas.microsoft.com/office/drawing/2010/main" xmlns="" w="9525">
+                  <a14:hiddenLine xmlns="" xmlns:a14="http://schemas.microsoft.com/office/drawing/2010/main" w="9525">
                     <a:solidFill>
                       <a:srgbClr val="000000"/>
                     </a:solidFill>
@@ -10943,7 +10948,7 @@
               </a:ln>
               <a:extLst>
                 <a:ext uri="{91240B29-F687-4f45-9708-019B960494DF}">
-                  <a14:hiddenLine xmlns:a14="http://schemas.microsoft.com/office/drawing/2010/main" xmlns="" w="9525">
+                  <a14:hiddenLine xmlns="" xmlns:a14="http://schemas.microsoft.com/office/drawing/2010/main" w="9525">
                     <a:solidFill>
                       <a:srgbClr val="000000"/>
                     </a:solidFill>
@@ -11063,7 +11068,7 @@
               </a:ln>
               <a:extLst>
                 <a:ext uri="{91240B29-F687-4f45-9708-019B960494DF}">
-                  <a14:hiddenLine xmlns:a14="http://schemas.microsoft.com/office/drawing/2010/main" xmlns="" w="9525">
+                  <a14:hiddenLine xmlns="" xmlns:a14="http://schemas.microsoft.com/office/drawing/2010/main" w="9525">
                     <a:solidFill>
                       <a:srgbClr val="000000"/>
                     </a:solidFill>
@@ -11161,7 +11166,7 @@
               </a:ln>
               <a:extLst>
                 <a:ext uri="{91240B29-F687-4f45-9708-019B960494DF}">
-                  <a14:hiddenLine xmlns:a14="http://schemas.microsoft.com/office/drawing/2010/main" xmlns="" w="9525">
+                  <a14:hiddenLine xmlns="" xmlns:a14="http://schemas.microsoft.com/office/drawing/2010/main" w="9525">
                     <a:solidFill>
                       <a:srgbClr val="000000"/>
                     </a:solidFill>
@@ -11276,7 +11281,7 @@
               </a:ln>
               <a:extLst>
                 <a:ext uri="{91240B29-F687-4f45-9708-019B960494DF}">
-                  <a14:hiddenLine xmlns:a14="http://schemas.microsoft.com/office/drawing/2010/main" xmlns="" w="9525">
+                  <a14:hiddenLine xmlns="" xmlns:a14="http://schemas.microsoft.com/office/drawing/2010/main" w="9525">
                     <a:solidFill>
                       <a:srgbClr val="000000"/>
                     </a:solidFill>
@@ -11366,7 +11371,7 @@
               </a:ln>
               <a:extLst>
                 <a:ext uri="{91240B29-F687-4f45-9708-019B960494DF}">
-                  <a14:hiddenLine xmlns:a14="http://schemas.microsoft.com/office/drawing/2010/main" xmlns="" w="9525">
+                  <a14:hiddenLine xmlns="" xmlns:a14="http://schemas.microsoft.com/office/drawing/2010/main" w="9525">
                     <a:solidFill>
                       <a:srgbClr val="000000"/>
                     </a:solidFill>
@@ -11431,7 +11436,7 @@
               </a:ln>
               <a:extLst>
                 <a:ext uri="{91240B29-F687-4f45-9708-019B960494DF}">
-                  <a14:hiddenLine xmlns:a14="http://schemas.microsoft.com/office/drawing/2010/main" xmlns="" w="9525">
+                  <a14:hiddenLine xmlns="" xmlns:a14="http://schemas.microsoft.com/office/drawing/2010/main" w="9525">
                     <a:solidFill>
                       <a:srgbClr val="000000"/>
                     </a:solidFill>
@@ -11521,7 +11526,7 @@
               </a:ln>
               <a:extLst>
                 <a:ext uri="{91240B29-F687-4f45-9708-019B960494DF}">
-                  <a14:hiddenLine xmlns:a14="http://schemas.microsoft.com/office/drawing/2010/main" xmlns="" w="9525">
+                  <a14:hiddenLine xmlns="" xmlns:a14="http://schemas.microsoft.com/office/drawing/2010/main" w="9525">
                     <a:solidFill>
                       <a:srgbClr val="000000"/>
                     </a:solidFill>
@@ -11589,7 +11594,7 @@
               </a:ln>
               <a:extLst>
                 <a:ext uri="{91240B29-F687-4f45-9708-019B960494DF}">
-                  <a14:hiddenLine xmlns:a14="http://schemas.microsoft.com/office/drawing/2010/main" xmlns="" w="9525">
+                  <a14:hiddenLine xmlns="" xmlns:a14="http://schemas.microsoft.com/office/drawing/2010/main" w="9525">
                     <a:solidFill>
                       <a:srgbClr val="000000"/>
                     </a:solidFill>
@@ -11679,7 +11684,7 @@
               </a:ln>
               <a:extLst>
                 <a:ext uri="{91240B29-F687-4f45-9708-019B960494DF}">
-                  <a14:hiddenLine xmlns:a14="http://schemas.microsoft.com/office/drawing/2010/main" xmlns="" w="9525">
+                  <a14:hiddenLine xmlns="" xmlns:a14="http://schemas.microsoft.com/office/drawing/2010/main" w="9525">
                     <a:solidFill>
                       <a:srgbClr val="000000"/>
                     </a:solidFill>
@@ -11747,7 +11752,7 @@
               </a:ln>
               <a:extLst>
                 <a:ext uri="{91240B29-F687-4f45-9708-019B960494DF}">
-                  <a14:hiddenLine xmlns:a14="http://schemas.microsoft.com/office/drawing/2010/main" xmlns="" w="9525">
+                  <a14:hiddenLine xmlns="" xmlns:a14="http://schemas.microsoft.com/office/drawing/2010/main" w="9525">
                     <a:solidFill>
                       <a:srgbClr val="000000"/>
                     </a:solidFill>
@@ -11837,7 +11842,7 @@
               </a:ln>
               <a:extLst>
                 <a:ext uri="{91240B29-F687-4f45-9708-019B960494DF}">
-                  <a14:hiddenLine xmlns:a14="http://schemas.microsoft.com/office/drawing/2010/main" xmlns="" w="9525">
+                  <a14:hiddenLine xmlns="" xmlns:a14="http://schemas.microsoft.com/office/drawing/2010/main" w="9525">
                     <a:solidFill>
                       <a:srgbClr val="000000"/>
                     </a:solidFill>
@@ -11871,7 +11876,7 @@
               </a:ln>
               <a:extLst>
                 <a:ext uri="{91240B29-F687-4f45-9708-019B960494DF}">
-                  <a14:hiddenLine xmlns:a14="http://schemas.microsoft.com/office/drawing/2010/main" xmlns="" w="9525">
+                  <a14:hiddenLine xmlns="" xmlns:a14="http://schemas.microsoft.com/office/drawing/2010/main" w="9525">
                     <a:solidFill>
                       <a:srgbClr val="000000"/>
                     </a:solidFill>
@@ -12500,7 +12505,9 @@
           </a:xfrm>
         </p:spPr>
         <p:txBody>
-          <a:bodyPr/>
+          <a:bodyPr>
+            <a:normAutofit fontScale="92500" lnSpcReduction="10000"/>
+          </a:bodyPr>
           <a:lstStyle/>
           <a:p>
             <a:r>
@@ -12604,16 +12611,6 @@
             </a:endParaRPr>
           </a:p>
           <a:p>
-            <a:endParaRPr lang="en-US" dirty="0">
-              <a:solidFill>
-                <a:schemeClr val="bg2">
-                  <a:lumMod val="60000"/>
-                  <a:lumOff val="40000"/>
-                </a:schemeClr>
-              </a:solidFill>
-            </a:endParaRPr>
-          </a:p>
-          <a:p>
             <a:r>
               <a:rPr lang="en-US" dirty="0" smtClean="0">
                 <a:solidFill>
@@ -12623,10 +12620,42 @@
                   </a:schemeClr>
                 </a:solidFill>
               </a:rPr>
-              <a:t>What would you change about the workshop?</a:t>
+              <a:t>What </a:t>
             </a:r>
-          </a:p>
-          <a:p>
+            <a:r>
+              <a:rPr lang="en-US" dirty="0" smtClean="0">
+                <a:solidFill>
+                  <a:schemeClr val="bg2">
+                    <a:lumMod val="60000"/>
+                    <a:lumOff val="40000"/>
+                  </a:schemeClr>
+                </a:solidFill>
+              </a:rPr>
+              <a:t>would you change about the workshop?</a:t>
+            </a:r>
+          </a:p>
+          <a:p>
+            <a:endParaRPr lang="en-US" dirty="0" smtClean="0">
+              <a:solidFill>
+                <a:schemeClr val="bg2">
+                  <a:lumMod val="60000"/>
+                  <a:lumOff val="40000"/>
+                </a:schemeClr>
+              </a:solidFill>
+            </a:endParaRPr>
+          </a:p>
+          <a:p>
+            <a:r>
+              <a:rPr lang="en-US" dirty="0" smtClean="0">
+                <a:solidFill>
+                  <a:schemeClr val="bg2">
+                    <a:lumMod val="60000"/>
+                    <a:lumOff val="40000"/>
+                  </a:schemeClr>
+                </a:solidFill>
+              </a:rPr>
+              <a:t>Has this workshop changed your perspective on tech?</a:t>
+            </a:r>
             <a:endParaRPr lang="en-GB" dirty="0">
               <a:solidFill>
                 <a:schemeClr val="bg2">

</xml_diff>